<commit_message>
Updated code doumentation and presentation
</commit_message>
<xml_diff>
--- a/presentation/Evolving Neural Networks for Retro Video Games.pptx
+++ b/presentation/Evolving Neural Networks for Retro Video Games.pptx
@@ -8,9 +8,9 @@
     <p:sldId id="256" r:id="rId2"/>
     <p:sldId id="257" r:id="rId3"/>
     <p:sldId id="258" r:id="rId4"/>
-    <p:sldId id="259" r:id="rId5"/>
-    <p:sldId id="260" r:id="rId6"/>
-    <p:sldId id="261" r:id="rId7"/>
+    <p:sldId id="260" r:id="rId5"/>
+    <p:sldId id="261" r:id="rId6"/>
+    <p:sldId id="259" r:id="rId7"/>
     <p:sldId id="262" r:id="rId8"/>
     <p:sldId id="264" r:id="rId9"/>
     <p:sldId id="265" r:id="rId10"/>
@@ -113,6 +113,11 @@
       </a:defRPr>
     </a:lvl9pPr>
   </p:defaultTextStyle>
+  <p:extLst>
+    <p:ext uri="{EFAFB233-063F-42B5-8137-9DF3F51BA10A}">
+      <p15:sldGuideLst xmlns:p15="http://schemas.microsoft.com/office/powerpoint/2012/main"/>
+    </p:ext>
+  </p:extLst>
 </p:presentation>
 </file>
 
@@ -263,7 +268,7 @@
           <a:p>
             <a:fld id="{62CE6098-7321-4951-8131-E38A2F96185C}" type="datetimeFigureOut">
               <a:rPr lang="en-US" smtClean="0"/>
-              <a:t>2/3/2021</a:t>
+              <a:t>2/4/2021</a:t>
             </a:fld>
             <a:endParaRPr lang="en-US"/>
           </a:p>
@@ -461,7 +466,7 @@
           <a:p>
             <a:fld id="{62CE6098-7321-4951-8131-E38A2F96185C}" type="datetimeFigureOut">
               <a:rPr lang="en-US" smtClean="0"/>
-              <a:t>2/3/2021</a:t>
+              <a:t>2/4/2021</a:t>
             </a:fld>
             <a:endParaRPr lang="en-US"/>
           </a:p>
@@ -669,7 +674,7 @@
           <a:p>
             <a:fld id="{62CE6098-7321-4951-8131-E38A2F96185C}" type="datetimeFigureOut">
               <a:rPr lang="en-US" smtClean="0"/>
-              <a:t>2/3/2021</a:t>
+              <a:t>2/4/2021</a:t>
             </a:fld>
             <a:endParaRPr lang="en-US"/>
           </a:p>
@@ -867,7 +872,7 @@
           <a:p>
             <a:fld id="{62CE6098-7321-4951-8131-E38A2F96185C}" type="datetimeFigureOut">
               <a:rPr lang="en-US" smtClean="0"/>
-              <a:t>2/3/2021</a:t>
+              <a:t>2/4/2021</a:t>
             </a:fld>
             <a:endParaRPr lang="en-US"/>
           </a:p>
@@ -1142,7 +1147,7 @@
           <a:p>
             <a:fld id="{62CE6098-7321-4951-8131-E38A2F96185C}" type="datetimeFigureOut">
               <a:rPr lang="en-US" smtClean="0"/>
-              <a:t>2/3/2021</a:t>
+              <a:t>2/4/2021</a:t>
             </a:fld>
             <a:endParaRPr lang="en-US"/>
           </a:p>
@@ -1407,7 +1412,7 @@
           <a:p>
             <a:fld id="{62CE6098-7321-4951-8131-E38A2F96185C}" type="datetimeFigureOut">
               <a:rPr lang="en-US" smtClean="0"/>
-              <a:t>2/3/2021</a:t>
+              <a:t>2/4/2021</a:t>
             </a:fld>
             <a:endParaRPr lang="en-US"/>
           </a:p>
@@ -1819,7 +1824,7 @@
           <a:p>
             <a:fld id="{62CE6098-7321-4951-8131-E38A2F96185C}" type="datetimeFigureOut">
               <a:rPr lang="en-US" smtClean="0"/>
-              <a:t>2/3/2021</a:t>
+              <a:t>2/4/2021</a:t>
             </a:fld>
             <a:endParaRPr lang="en-US"/>
           </a:p>
@@ -1960,7 +1965,7 @@
           <a:p>
             <a:fld id="{62CE6098-7321-4951-8131-E38A2F96185C}" type="datetimeFigureOut">
               <a:rPr lang="en-US" smtClean="0"/>
-              <a:t>2/3/2021</a:t>
+              <a:t>2/4/2021</a:t>
             </a:fld>
             <a:endParaRPr lang="en-US"/>
           </a:p>
@@ -2073,7 +2078,7 @@
           <a:p>
             <a:fld id="{62CE6098-7321-4951-8131-E38A2F96185C}" type="datetimeFigureOut">
               <a:rPr lang="en-US" smtClean="0"/>
-              <a:t>2/3/2021</a:t>
+              <a:t>2/4/2021</a:t>
             </a:fld>
             <a:endParaRPr lang="en-US"/>
           </a:p>
@@ -2384,7 +2389,7 @@
           <a:p>
             <a:fld id="{62CE6098-7321-4951-8131-E38A2F96185C}" type="datetimeFigureOut">
               <a:rPr lang="en-US" smtClean="0"/>
-              <a:t>2/3/2021</a:t>
+              <a:t>2/4/2021</a:t>
             </a:fld>
             <a:endParaRPr lang="en-US"/>
           </a:p>
@@ -2672,7 +2677,7 @@
           <a:p>
             <a:fld id="{62CE6098-7321-4951-8131-E38A2F96185C}" type="datetimeFigureOut">
               <a:rPr lang="en-US" smtClean="0"/>
-              <a:t>2/3/2021</a:t>
+              <a:t>2/4/2021</a:t>
             </a:fld>
             <a:endParaRPr lang="en-US"/>
           </a:p>
@@ -2913,7 +2918,7 @@
           <a:p>
             <a:fld id="{62CE6098-7321-4951-8131-E38A2F96185C}" type="datetimeFigureOut">
               <a:rPr lang="en-US" smtClean="0"/>
-              <a:t>2/3/2021</a:t>
+              <a:t>2/4/2021</a:t>
             </a:fld>
             <a:endParaRPr lang="en-US"/>
           </a:p>
@@ -3316,6 +3321,20 @@
 <file path=ppt/slides/slide1.xml><?xml version="1.0" encoding="utf-8"?>
 <p:sld xmlns:a="http://schemas.openxmlformats.org/drawingml/2006/main" xmlns:r="http://schemas.openxmlformats.org/officeDocument/2006/relationships" xmlns:p="http://schemas.openxmlformats.org/presentationml/2006/main">
   <p:cSld>
+    <p:bg>
+      <p:bgPr>
+        <a:blipFill dpi="0" rotWithShape="1">
+          <a:blip r:embed="rId2">
+            <a:lum/>
+          </a:blip>
+          <a:srcRect/>
+          <a:stretch>
+            <a:fillRect/>
+          </a:stretch>
+        </a:blipFill>
+        <a:effectLst/>
+      </p:bgPr>
+    </p:bg>
     <p:spTree>
       <p:nvGrpSpPr>
         <p:cNvPr id="1" name=""/>
@@ -3330,42 +3349,59 @@
           <a:chExt cx="0" cy="0"/>
         </a:xfrm>
       </p:grpSpPr>
-      <p:pic>
-        <p:nvPicPr>
-          <p:cNvPr id="5" name="Picture 4" descr="Text&#10;&#10;Description automatically generated">
-            <a:extLst>
-              <a:ext uri="{FF2B5EF4-FFF2-40B4-BE49-F238E27FC236}">
-                <a16:creationId xmlns:a16="http://schemas.microsoft.com/office/drawing/2014/main" id="{7F350771-55B1-44C8-9C0F-A06544BDA63F}"/>
-              </a:ext>
-            </a:extLst>
-          </p:cNvPr>
-          <p:cNvPicPr>
-            <a:picLocks noChangeAspect="1"/>
-          </p:cNvPicPr>
+      <p:sp>
+        <p:nvSpPr>
+          <p:cNvPr id="2" name="TextBox 1">
+            <a:extLst>
+              <a:ext uri="{FF2B5EF4-FFF2-40B4-BE49-F238E27FC236}">
+                <a16:creationId xmlns:a16="http://schemas.microsoft.com/office/drawing/2014/main" id="{5CE4459F-AF8A-42C8-AF13-88619E2C444B}"/>
+              </a:ext>
+            </a:extLst>
+          </p:cNvPr>
+          <p:cNvSpPr txBox="1"/>
           <p:nvPr/>
-        </p:nvPicPr>
-        <p:blipFill>
-          <a:blip r:embed="rId2">
-            <a:extLst>
-              <a:ext uri="{28A0092B-C50C-407E-A947-70E740481C1C}">
-                <a14:useLocalDpi xmlns:a14="http://schemas.microsoft.com/office/drawing/2010/main" val="0"/>
-              </a:ext>
-            </a:extLst>
-          </a:blip>
-          <a:stretch>
-            <a:fillRect/>
-          </a:stretch>
-        </p:blipFill>
+        </p:nvSpPr>
         <p:spPr>
           <a:xfrm>
-            <a:off x="0" y="0"/>
-            <a:ext cx="12192000" cy="6858000"/>
+            <a:off x="5388075" y="3429000"/>
+            <a:ext cx="6587613" cy="1815882"/>
           </a:xfrm>
           <a:prstGeom prst="rect">
             <a:avLst/>
           </a:prstGeom>
+          <a:noFill/>
         </p:spPr>
-      </p:pic>
+        <p:txBody>
+          <a:bodyPr wrap="square" rtlCol="0">
+            <a:spAutoFit/>
+          </a:bodyPr>
+          <a:lstStyle/>
+          <a:p>
+            <a:r>
+              <a:rPr lang="en-US" sz="2800" b="1" dirty="0"/>
+              <a:t>John McMeen</a:t>
+            </a:r>
+          </a:p>
+          <a:p>
+            <a:r>
+              <a:rPr lang="en-US" sz="2800" dirty="0"/>
+              <a:t>Computer and Information Sciences</a:t>
+            </a:r>
+          </a:p>
+          <a:p>
+            <a:r>
+              <a:rPr lang="en-US" sz="2800" dirty="0"/>
+              <a:t>Northeast State Community College</a:t>
+            </a:r>
+          </a:p>
+          <a:p>
+            <a:r>
+              <a:rPr lang="en-US" sz="2800" dirty="0"/>
+              <a:t>2/4/2021</a:t>
+            </a:r>
+          </a:p>
+        </p:txBody>
+      </p:sp>
     </p:spTree>
     <p:extLst>
       <p:ext uri="{BB962C8B-B14F-4D97-AF65-F5344CB8AC3E}">
@@ -3382,6 +3418,21 @@
 <file path=ppt/slides/slide10.xml><?xml version="1.0" encoding="utf-8"?>
 <p:sld xmlns:a="http://schemas.openxmlformats.org/drawingml/2006/main" xmlns:r="http://schemas.openxmlformats.org/officeDocument/2006/relationships" xmlns:p="http://schemas.openxmlformats.org/presentationml/2006/main">
   <p:cSld>
+    <p:bg>
+      <p:bgPr>
+        <a:blipFill dpi="0" rotWithShape="1">
+          <a:blip r:embed="rId2">
+            <a:alphaModFix amt="34000"/>
+            <a:lum/>
+          </a:blip>
+          <a:srcRect/>
+          <a:stretch>
+            <a:fillRect/>
+          </a:stretch>
+        </a:blipFill>
+        <a:effectLst/>
+      </p:bgPr>
+    </p:bg>
     <p:spTree>
       <p:nvGrpSpPr>
         <p:cNvPr id="1" name=""/>
@@ -3418,34 +3469,85 @@
           <a:lstStyle/>
           <a:p>
             <a:r>
+              <a:rPr lang="en-US" b="1" dirty="0"/>
+              <a:t>Sources</a:t>
+            </a:r>
+          </a:p>
+        </p:txBody>
+      </p:sp>
+      <p:sp>
+        <p:nvSpPr>
+          <p:cNvPr id="3" name="Content Placeholder 2">
+            <a:extLst>
+              <a:ext uri="{FF2B5EF4-FFF2-40B4-BE49-F238E27FC236}">
+                <a16:creationId xmlns:a16="http://schemas.microsoft.com/office/drawing/2014/main" id="{1A011658-19DE-474D-BBA2-7A6AD1D563B2}"/>
+              </a:ext>
+            </a:extLst>
+          </p:cNvPr>
+          <p:cNvSpPr>
+            <a:spLocks noGrp="1"/>
+          </p:cNvSpPr>
+          <p:nvPr>
+            <p:ph idx="1"/>
+          </p:nvPr>
+        </p:nvSpPr>
+        <p:spPr/>
+        <p:txBody>
+          <a:bodyPr/>
+          <a:lstStyle/>
+          <a:p>
+            <a:r>
               <a:rPr lang="en-US" dirty="0"/>
-              <a:t>Sources</a:t>
-            </a:r>
-          </a:p>
-        </p:txBody>
-      </p:sp>
-      <p:sp>
-        <p:nvSpPr>
-          <p:cNvPr id="3" name="Content Placeholder 2">
-            <a:extLst>
-              <a:ext uri="{FF2B5EF4-FFF2-40B4-BE49-F238E27FC236}">
-                <a16:creationId xmlns:a16="http://schemas.microsoft.com/office/drawing/2014/main" id="{1A011658-19DE-474D-BBA2-7A6AD1D563B2}"/>
-              </a:ext>
-            </a:extLst>
-          </p:cNvPr>
-          <p:cNvSpPr>
-            <a:spLocks noGrp="1"/>
-          </p:cNvSpPr>
-          <p:nvPr>
-            <p:ph idx="1"/>
-          </p:nvPr>
-        </p:nvSpPr>
-        <p:spPr/>
-        <p:txBody>
-          <a:bodyPr/>
-          <a:lstStyle/>
-          <a:p>
-            <a:endParaRPr lang="en-US"/>
+              <a:t>Evolving Neural Networks through Augmenting Topologies - </a:t>
+            </a:r>
+            <a:r>
+              <a:rPr lang="en-US" dirty="0">
+                <a:hlinkClick r:id="rId3"/>
+              </a:rPr>
+              <a:t>http://nn.cs.utexas.edu/downloads/papers/stanley.ec02.pdf</a:t>
+            </a:r>
+            <a:endParaRPr lang="en-US" dirty="0"/>
+          </a:p>
+          <a:p>
+            <a:endParaRPr lang="en-US" dirty="0"/>
+          </a:p>
+          <a:p>
+            <a:r>
+              <a:rPr lang="en-US" dirty="0"/>
+              <a:t>NEAT-Python - </a:t>
+            </a:r>
+            <a:r>
+              <a:rPr lang="en-US" dirty="0">
+                <a:hlinkClick r:id="rId4"/>
+              </a:rPr>
+              <a:t>https://neat-python.readthedocs.io/en/latest/</a:t>
+            </a:r>
+            <a:endParaRPr lang="en-US" dirty="0"/>
+          </a:p>
+          <a:p>
+            <a:endParaRPr lang="en-US" dirty="0"/>
+          </a:p>
+          <a:p>
+            <a:r>
+              <a:rPr lang="en-US" dirty="0"/>
+              <a:t>Lucas Thompson Sonic Bot - </a:t>
+            </a:r>
+            <a:r>
+              <a:rPr lang="en-US" dirty="0">
+                <a:hlinkClick r:id="rId5"/>
+              </a:rPr>
+              <a:t>https://gitlab.com/lucasrthompson/Sonic-Bot-In-OpenAI-and-NEAT</a:t>
+            </a:r>
+            <a:endParaRPr lang="en-US" dirty="0"/>
+          </a:p>
+          <a:p>
+            <a:endParaRPr lang="en-US" dirty="0"/>
+          </a:p>
+          <a:p>
+            <a:endParaRPr lang="en-US" dirty="0"/>
+          </a:p>
+          <a:p>
+            <a:endParaRPr lang="en-US" dirty="0"/>
           </a:p>
         </p:txBody>
       </p:sp>
@@ -3465,6 +3567,21 @@
 <file path=ppt/slides/slide2.xml><?xml version="1.0" encoding="utf-8"?>
 <p:sld xmlns:a="http://schemas.openxmlformats.org/drawingml/2006/main" xmlns:r="http://schemas.openxmlformats.org/officeDocument/2006/relationships" xmlns:p="http://schemas.openxmlformats.org/presentationml/2006/main">
   <p:cSld>
+    <p:bg>
+      <p:bgPr>
+        <a:blipFill dpi="0" rotWithShape="1">
+          <a:blip r:embed="rId2">
+            <a:alphaModFix amt="34000"/>
+            <a:lum/>
+          </a:blip>
+          <a:srcRect/>
+          <a:stretch>
+            <a:fillRect/>
+          </a:stretch>
+        </a:blipFill>
+        <a:effectLst/>
+      </p:bgPr>
+    </p:bg>
     <p:spTree>
       <p:nvGrpSpPr>
         <p:cNvPr id="1" name=""/>
@@ -3501,7 +3618,7 @@
           <a:lstStyle/>
           <a:p>
             <a:r>
-              <a:rPr lang="en-US" dirty="0"/>
+              <a:rPr lang="en-US" b="1" dirty="0"/>
               <a:t>Overview</a:t>
             </a:r>
           </a:p>
@@ -3525,35 +3642,37 @@
         </p:nvSpPr>
         <p:spPr/>
         <p:txBody>
-          <a:bodyPr/>
-          <a:lstStyle/>
-          <a:p>
-            <a:r>
-              <a:rPr lang="en-US" dirty="0"/>
+          <a:bodyPr>
+            <a:normAutofit/>
+          </a:bodyPr>
+          <a:lstStyle/>
+          <a:p>
+            <a:r>
+              <a:rPr lang="en-US" sz="4000" dirty="0"/>
               <a:t>Machine Learning</a:t>
             </a:r>
           </a:p>
           <a:p>
             <a:r>
-              <a:rPr lang="en-US" dirty="0"/>
+              <a:rPr lang="en-US" sz="4000" dirty="0"/>
+              <a:t>Why Retro Games?</a:t>
+            </a:r>
+          </a:p>
+          <a:p>
+            <a:r>
+              <a:rPr lang="en-US" sz="4000" dirty="0"/>
+              <a:t>Open AI Gym Retro</a:t>
+            </a:r>
+          </a:p>
+          <a:p>
+            <a:r>
+              <a:rPr lang="en-US" sz="4000" dirty="0"/>
               <a:t>NEAT</a:t>
             </a:r>
           </a:p>
           <a:p>
             <a:r>
-              <a:rPr lang="en-US" dirty="0"/>
-              <a:t>Retro Games</a:t>
-            </a:r>
-          </a:p>
-          <a:p>
-            <a:r>
-              <a:rPr lang="en-US" dirty="0"/>
-              <a:t>Open AI Gym Retro</a:t>
-            </a:r>
-          </a:p>
-          <a:p>
-            <a:r>
-              <a:rPr lang="en-US" dirty="0"/>
+              <a:rPr lang="en-US" sz="4000" dirty="0"/>
               <a:t>Code Review</a:t>
             </a:r>
           </a:p>
@@ -3575,6 +3694,21 @@
 <file path=ppt/slides/slide3.xml><?xml version="1.0" encoding="utf-8"?>
 <p:sld xmlns:a="http://schemas.openxmlformats.org/drawingml/2006/main" xmlns:r="http://schemas.openxmlformats.org/officeDocument/2006/relationships" xmlns:p="http://schemas.openxmlformats.org/presentationml/2006/main">
   <p:cSld>
+    <p:bg>
+      <p:bgPr>
+        <a:blipFill dpi="0" rotWithShape="1">
+          <a:blip r:embed="rId2">
+            <a:alphaModFix amt="34000"/>
+            <a:lum/>
+          </a:blip>
+          <a:srcRect/>
+          <a:stretch>
+            <a:fillRect/>
+          </a:stretch>
+        </a:blipFill>
+        <a:effectLst/>
+      </p:bgPr>
+    </p:bg>
     <p:spTree>
       <p:nvGrpSpPr>
         <p:cNvPr id="1" name=""/>
@@ -3611,7 +3745,7 @@
           <a:lstStyle/>
           <a:p>
             <a:r>
-              <a:rPr lang="en-US" dirty="0"/>
+              <a:rPr lang="en-US" b="1" dirty="0"/>
               <a:t>Machine Learning</a:t>
             </a:r>
           </a:p>
@@ -3688,6 +3822,21 @@
 <file path=ppt/slides/slide4.xml><?xml version="1.0" encoding="utf-8"?>
 <p:sld xmlns:a="http://schemas.openxmlformats.org/drawingml/2006/main" xmlns:r="http://schemas.openxmlformats.org/officeDocument/2006/relationships" xmlns:p="http://schemas.openxmlformats.org/presentationml/2006/main">
   <p:cSld>
+    <p:bg>
+      <p:bgPr>
+        <a:blipFill dpi="0" rotWithShape="1">
+          <a:blip r:embed="rId2">
+            <a:alphaModFix amt="34000"/>
+            <a:lum/>
+          </a:blip>
+          <a:srcRect/>
+          <a:stretch>
+            <a:fillRect/>
+          </a:stretch>
+        </a:blipFill>
+        <a:effectLst/>
+      </p:bgPr>
+    </p:bg>
     <p:spTree>
       <p:nvGrpSpPr>
         <p:cNvPr id="1" name=""/>
@@ -3707,7 +3856,7 @@
           <p:cNvPr id="2" name="Title 1">
             <a:extLst>
               <a:ext uri="{FF2B5EF4-FFF2-40B4-BE49-F238E27FC236}">
-                <a16:creationId xmlns:a16="http://schemas.microsoft.com/office/drawing/2014/main" id="{497EDBD6-1142-4441-AE33-48F513723CD7}"/>
+                <a16:creationId xmlns:a16="http://schemas.microsoft.com/office/drawing/2014/main" id="{46016D5C-D81C-4DB7-81B7-42E99426AEF8}"/>
               </a:ext>
             </a:extLst>
           </p:cNvPr>
@@ -3724,40 +3873,45 @@
           <a:lstStyle/>
           <a:p>
             <a:r>
+              <a:rPr lang="en-US" b="1" dirty="0"/>
+              <a:t>Why Retro Games?</a:t>
+            </a:r>
+          </a:p>
+        </p:txBody>
+      </p:sp>
+      <p:sp>
+        <p:nvSpPr>
+          <p:cNvPr id="3" name="Content Placeholder 2">
+            <a:extLst>
+              <a:ext uri="{FF2B5EF4-FFF2-40B4-BE49-F238E27FC236}">
+                <a16:creationId xmlns:a16="http://schemas.microsoft.com/office/drawing/2014/main" id="{E5F8B6F5-54F0-4B14-BED2-8D1CEECBB945}"/>
+              </a:ext>
+            </a:extLst>
+          </p:cNvPr>
+          <p:cNvSpPr>
+            <a:spLocks noGrp="1"/>
+          </p:cNvSpPr>
+          <p:nvPr>
+            <p:ph idx="1"/>
+          </p:nvPr>
+        </p:nvSpPr>
+        <p:spPr/>
+        <p:txBody>
+          <a:bodyPr/>
+          <a:lstStyle/>
+          <a:p>
+            <a:r>
               <a:rPr lang="en-US" dirty="0"/>
-              <a:t>NEAT</a:t>
-            </a:r>
-          </a:p>
-        </p:txBody>
-      </p:sp>
-      <p:sp>
-        <p:nvSpPr>
-          <p:cNvPr id="3" name="Content Placeholder 2">
-            <a:extLst>
-              <a:ext uri="{FF2B5EF4-FFF2-40B4-BE49-F238E27FC236}">
-                <a16:creationId xmlns:a16="http://schemas.microsoft.com/office/drawing/2014/main" id="{F6116EB5-B11D-496E-97F3-230D0F27D003}"/>
-              </a:ext>
-            </a:extLst>
-          </p:cNvPr>
-          <p:cNvSpPr>
-            <a:spLocks noGrp="1"/>
-          </p:cNvSpPr>
-          <p:nvPr>
-            <p:ph idx="1"/>
-          </p:nvPr>
-        </p:nvSpPr>
-        <p:spPr/>
-        <p:txBody>
-          <a:bodyPr/>
-          <a:lstStyle/>
-          <a:p>
-            <a:r>
-              <a:rPr lang="en-US" dirty="0" err="1"/>
-              <a:t>Neuroevolution</a:t>
-            </a:r>
+              <a:t>Many existing problems</a:t>
+            </a:r>
+          </a:p>
+          <a:p>
+            <a:endParaRPr lang="en-US" dirty="0"/>
+          </a:p>
+          <a:p>
             <a:r>
               <a:rPr lang="en-US" dirty="0"/>
-              <a:t> of augmenting topologies</a:t>
+              <a:t>Created without bias</a:t>
             </a:r>
           </a:p>
           <a:p>
@@ -3766,7 +3920,7 @@
           <a:p>
             <a:r>
               <a:rPr lang="en-US" dirty="0"/>
-              <a:t>Genetic algorithm which evolves neural networks</a:t>
+              <a:t>Simple decision-based mechanisms</a:t>
             </a:r>
           </a:p>
           <a:p>
@@ -3775,16 +3929,7 @@
           <a:p>
             <a:r>
               <a:rPr lang="en-US" dirty="0"/>
-              <a:t>Ken Stanley in 2002 while at The University of Texas at Austin</a:t>
-            </a:r>
-          </a:p>
-          <a:p>
-            <a:endParaRPr lang="en-US" dirty="0"/>
-          </a:p>
-          <a:p>
-            <a:r>
-              <a:rPr lang="en-US" dirty="0"/>
-              <a:t>NEAT Python</a:t>
+              <a:t>ALL YOUR FUN ARE BELONG TO US!</a:t>
             </a:r>
           </a:p>
         </p:txBody>
@@ -3792,7 +3937,7 @@
     </p:spTree>
     <p:extLst>
       <p:ext uri="{BB962C8B-B14F-4D97-AF65-F5344CB8AC3E}">
-        <p14:creationId xmlns:p14="http://schemas.microsoft.com/office/powerpoint/2010/main" val="4250619945"/>
+        <p14:creationId xmlns:p14="http://schemas.microsoft.com/office/powerpoint/2010/main" val="2149190749"/>
       </p:ext>
     </p:extLst>
   </p:cSld>
@@ -3805,6 +3950,21 @@
 <file path=ppt/slides/slide5.xml><?xml version="1.0" encoding="utf-8"?>
 <p:sld xmlns:a="http://schemas.openxmlformats.org/drawingml/2006/main" xmlns:r="http://schemas.openxmlformats.org/officeDocument/2006/relationships" xmlns:p="http://schemas.openxmlformats.org/presentationml/2006/main">
   <p:cSld>
+    <p:bg>
+      <p:bgPr>
+        <a:blipFill dpi="0" rotWithShape="1">
+          <a:blip r:embed="rId2">
+            <a:alphaModFix amt="34000"/>
+            <a:lum/>
+          </a:blip>
+          <a:srcRect/>
+          <a:stretch>
+            <a:fillRect/>
+          </a:stretch>
+        </a:blipFill>
+        <a:effectLst/>
+      </p:bgPr>
+    </p:bg>
     <p:spTree>
       <p:nvGrpSpPr>
         <p:cNvPr id="1" name=""/>
@@ -3824,7 +3984,7 @@
           <p:cNvPr id="2" name="Title 1">
             <a:extLst>
               <a:ext uri="{FF2B5EF4-FFF2-40B4-BE49-F238E27FC236}">
-                <a16:creationId xmlns:a16="http://schemas.microsoft.com/office/drawing/2014/main" id="{46016D5C-D81C-4DB7-81B7-42E99426AEF8}"/>
+                <a16:creationId xmlns:a16="http://schemas.microsoft.com/office/drawing/2014/main" id="{638BBBDF-F5CC-4E67-A9CD-32166C998D08}"/>
               </a:ext>
             </a:extLst>
           </p:cNvPr>
@@ -3841,32 +4001,62 @@
           <a:lstStyle/>
           <a:p>
             <a:r>
+              <a:rPr lang="en-US" b="1" dirty="0"/>
+              <a:t>Open AI Gym Retro</a:t>
+            </a:r>
+          </a:p>
+        </p:txBody>
+      </p:sp>
+      <p:sp>
+        <p:nvSpPr>
+          <p:cNvPr id="3" name="Content Placeholder 2">
+            <a:extLst>
+              <a:ext uri="{FF2B5EF4-FFF2-40B4-BE49-F238E27FC236}">
+                <a16:creationId xmlns:a16="http://schemas.microsoft.com/office/drawing/2014/main" id="{95538E05-6668-4530-BEC0-73202D3FF9FE}"/>
+              </a:ext>
+            </a:extLst>
+          </p:cNvPr>
+          <p:cNvSpPr>
+            <a:spLocks noGrp="1"/>
+          </p:cNvSpPr>
+          <p:nvPr>
+            <p:ph idx="1"/>
+          </p:nvPr>
+        </p:nvSpPr>
+        <p:spPr/>
+        <p:txBody>
+          <a:bodyPr/>
+          <a:lstStyle/>
+          <a:p>
+            <a:r>
               <a:rPr lang="en-US" dirty="0"/>
-              <a:t>R E T R O F U T U R E</a:t>
-            </a:r>
-          </a:p>
-        </p:txBody>
-      </p:sp>
-      <p:sp>
-        <p:nvSpPr>
-          <p:cNvPr id="3" name="Content Placeholder 2">
-            <a:extLst>
-              <a:ext uri="{FF2B5EF4-FFF2-40B4-BE49-F238E27FC236}">
-                <a16:creationId xmlns:a16="http://schemas.microsoft.com/office/drawing/2014/main" id="{E5F8B6F5-54F0-4B14-BED2-8D1CEECBB945}"/>
-              </a:ext>
-            </a:extLst>
-          </p:cNvPr>
-          <p:cNvSpPr>
-            <a:spLocks noGrp="1"/>
-          </p:cNvSpPr>
-          <p:nvPr>
-            <p:ph idx="1"/>
-          </p:nvPr>
-        </p:nvSpPr>
-        <p:spPr/>
-        <p:txBody>
-          <a:bodyPr/>
-          <a:lstStyle/>
+              <a:t>Open source, many existing game integrations</a:t>
+            </a:r>
+          </a:p>
+          <a:p>
+            <a:endParaRPr lang="en-US" dirty="0"/>
+          </a:p>
+          <a:p>
+            <a:r>
+              <a:rPr lang="en-US" dirty="0"/>
+              <a:t>Creates emulated game environment with game loop</a:t>
+            </a:r>
+          </a:p>
+          <a:p>
+            <a:endParaRPr lang="en-US" dirty="0"/>
+          </a:p>
+          <a:p>
+            <a:r>
+              <a:rPr lang="en-US" dirty="0"/>
+              <a:t>Adds functionality to examine emulator RAM (memory) </a:t>
+            </a:r>
+          </a:p>
+          <a:p>
+            <a:pPr marL="0" indent="0">
+              <a:buNone/>
+            </a:pPr>
+            <a:endParaRPr lang="en-US" dirty="0"/>
+          </a:p>
           <a:p>
             <a:endParaRPr lang="en-US" dirty="0"/>
           </a:p>
@@ -3875,7 +4065,7 @@
     </p:spTree>
     <p:extLst>
       <p:ext uri="{BB962C8B-B14F-4D97-AF65-F5344CB8AC3E}">
-        <p14:creationId xmlns:p14="http://schemas.microsoft.com/office/powerpoint/2010/main" val="2149190749"/>
+        <p14:creationId xmlns:p14="http://schemas.microsoft.com/office/powerpoint/2010/main" val="3997740862"/>
       </p:ext>
     </p:extLst>
   </p:cSld>
@@ -3888,6 +4078,21 @@
 <file path=ppt/slides/slide6.xml><?xml version="1.0" encoding="utf-8"?>
 <p:sld xmlns:a="http://schemas.openxmlformats.org/drawingml/2006/main" xmlns:r="http://schemas.openxmlformats.org/officeDocument/2006/relationships" xmlns:p="http://schemas.openxmlformats.org/presentationml/2006/main">
   <p:cSld>
+    <p:bg>
+      <p:bgPr>
+        <a:blipFill dpi="0" rotWithShape="1">
+          <a:blip r:embed="rId2">
+            <a:alphaModFix amt="34000"/>
+            <a:lum/>
+          </a:blip>
+          <a:srcRect/>
+          <a:stretch>
+            <a:fillRect/>
+          </a:stretch>
+        </a:blipFill>
+        <a:effectLst/>
+      </p:bgPr>
+    </p:bg>
     <p:spTree>
       <p:nvGrpSpPr>
         <p:cNvPr id="1" name=""/>
@@ -3907,7 +4112,7 @@
           <p:cNvPr id="2" name="Title 1">
             <a:extLst>
               <a:ext uri="{FF2B5EF4-FFF2-40B4-BE49-F238E27FC236}">
-                <a16:creationId xmlns:a16="http://schemas.microsoft.com/office/drawing/2014/main" id="{638BBBDF-F5CC-4E67-A9CD-32166C998D08}"/>
+                <a16:creationId xmlns:a16="http://schemas.microsoft.com/office/drawing/2014/main" id="{497EDBD6-1142-4441-AE33-48F513723CD7}"/>
               </a:ext>
             </a:extLst>
           </p:cNvPr>
@@ -3924,36 +4129,49 @@
           <a:lstStyle/>
           <a:p>
             <a:r>
+              <a:rPr lang="en-US" b="1" dirty="0"/>
+              <a:t>NEAT</a:t>
+            </a:r>
+          </a:p>
+        </p:txBody>
+      </p:sp>
+      <p:sp>
+        <p:nvSpPr>
+          <p:cNvPr id="3" name="Content Placeholder 2">
+            <a:extLst>
+              <a:ext uri="{FF2B5EF4-FFF2-40B4-BE49-F238E27FC236}">
+                <a16:creationId xmlns:a16="http://schemas.microsoft.com/office/drawing/2014/main" id="{F6116EB5-B11D-496E-97F3-230D0F27D003}"/>
+              </a:ext>
+            </a:extLst>
+          </p:cNvPr>
+          <p:cNvSpPr>
+            <a:spLocks noGrp="1"/>
+          </p:cNvSpPr>
+          <p:nvPr>
+            <p:ph idx="1"/>
+          </p:nvPr>
+        </p:nvSpPr>
+        <p:spPr/>
+        <p:txBody>
+          <a:bodyPr/>
+          <a:lstStyle/>
+          <a:p>
+            <a:r>
+              <a:rPr lang="en-US" dirty="0" err="1"/>
+              <a:t>Neuroevolution</a:t>
+            </a:r>
+            <a:r>
               <a:rPr lang="en-US" dirty="0"/>
-              <a:t>Open AI Gym Retro</a:t>
-            </a:r>
-          </a:p>
-        </p:txBody>
-      </p:sp>
-      <p:sp>
-        <p:nvSpPr>
-          <p:cNvPr id="3" name="Content Placeholder 2">
-            <a:extLst>
-              <a:ext uri="{FF2B5EF4-FFF2-40B4-BE49-F238E27FC236}">
-                <a16:creationId xmlns:a16="http://schemas.microsoft.com/office/drawing/2014/main" id="{95538E05-6668-4530-BEC0-73202D3FF9FE}"/>
-              </a:ext>
-            </a:extLst>
-          </p:cNvPr>
-          <p:cNvSpPr>
-            <a:spLocks noGrp="1"/>
-          </p:cNvSpPr>
-          <p:nvPr>
-            <p:ph idx="1"/>
-          </p:nvPr>
-        </p:nvSpPr>
-        <p:spPr/>
-        <p:txBody>
-          <a:bodyPr/>
-          <a:lstStyle/>
+              <a:t> of augmenting topologies</a:t>
+            </a:r>
+          </a:p>
+          <a:p>
+            <a:endParaRPr lang="en-US" dirty="0"/>
+          </a:p>
           <a:p>
             <a:r>
               <a:rPr lang="en-US" dirty="0"/>
-              <a:t>Open source, many existing game integrations</a:t>
+              <a:t>Genetic algorithm which evolves neural network structure</a:t>
             </a:r>
           </a:p>
           <a:p>
@@ -3962,7 +4180,7 @@
           <a:p>
             <a:r>
               <a:rPr lang="en-US" dirty="0"/>
-              <a:t>Creates emulated game environment with game loop</a:t>
+              <a:t>Ken Stanley in 2002 while at The University of Texas at Austin</a:t>
             </a:r>
           </a:p>
           <a:p>
@@ -3971,24 +4189,15 @@
           <a:p>
             <a:r>
               <a:rPr lang="en-US" dirty="0"/>
-              <a:t>Adds functionality to examine emulator RAM (memory) </a:t>
-            </a:r>
-          </a:p>
-          <a:p>
-            <a:pPr marL="0" indent="0">
-              <a:buNone/>
-            </a:pPr>
-            <a:endParaRPr lang="en-US" dirty="0"/>
-          </a:p>
-          <a:p>
-            <a:endParaRPr lang="en-US" dirty="0"/>
+              <a:t>NEAT Python</a:t>
+            </a:r>
           </a:p>
         </p:txBody>
       </p:sp>
     </p:spTree>
     <p:extLst>
       <p:ext uri="{BB962C8B-B14F-4D97-AF65-F5344CB8AC3E}">
-        <p14:creationId xmlns:p14="http://schemas.microsoft.com/office/powerpoint/2010/main" val="3997740862"/>
+        <p14:creationId xmlns:p14="http://schemas.microsoft.com/office/powerpoint/2010/main" val="4250619945"/>
       </p:ext>
     </p:extLst>
   </p:cSld>
@@ -4001,6 +4210,21 @@
 <file path=ppt/slides/slide7.xml><?xml version="1.0" encoding="utf-8"?>
 <p:sld xmlns:a="http://schemas.openxmlformats.org/drawingml/2006/main" xmlns:r="http://schemas.openxmlformats.org/officeDocument/2006/relationships" xmlns:p="http://schemas.openxmlformats.org/presentationml/2006/main">
   <p:cSld>
+    <p:bg>
+      <p:bgPr>
+        <a:blipFill dpi="0" rotWithShape="1">
+          <a:blip r:embed="rId2">
+            <a:alphaModFix amt="34000"/>
+            <a:lum/>
+          </a:blip>
+          <a:srcRect/>
+          <a:stretch>
+            <a:fillRect/>
+          </a:stretch>
+        </a:blipFill>
+        <a:effectLst/>
+      </p:bgPr>
+    </p:bg>
     <p:spTree>
       <p:nvGrpSpPr>
         <p:cNvPr id="1" name=""/>
@@ -4037,7 +4261,7 @@
           <a:lstStyle/>
           <a:p>
             <a:r>
-              <a:rPr lang="en-US" dirty="0"/>
+              <a:rPr lang="en-US" b="1" dirty="0"/>
               <a:t>Code Review</a:t>
             </a:r>
           </a:p>
@@ -4077,6 +4301,32 @@
               <a:rPr lang="en-US" dirty="0"/>
               <a:t>Cleaned up and documented</a:t>
             </a:r>
+          </a:p>
+          <a:p>
+            <a:endParaRPr lang="en-US" dirty="0"/>
+          </a:p>
+          <a:p>
+            <a:r>
+              <a:rPr lang="en-US" dirty="0" err="1"/>
+              <a:t>Github</a:t>
+            </a:r>
+            <a:r>
+              <a:rPr lang="en-US" dirty="0"/>
+              <a:t>: </a:t>
+            </a:r>
+            <a:r>
+              <a:rPr lang="en-US" dirty="0">
+                <a:hlinkClick r:id="rId3"/>
+              </a:rPr>
+              <a:t>https://github.com/jmcmeen/novus-retro.git</a:t>
+            </a:r>
+            <a:endParaRPr lang="en-US" dirty="0"/>
+          </a:p>
+          <a:p>
+            <a:endParaRPr lang="en-US" dirty="0"/>
+          </a:p>
+          <a:p>
+            <a:endParaRPr lang="en-US" dirty="0"/>
           </a:p>
           <a:p>
             <a:endParaRPr lang="en-US" dirty="0"/>
@@ -4105,6 +4355,21 @@
 <file path=ppt/slides/slide8.xml><?xml version="1.0" encoding="utf-8"?>
 <p:sld xmlns:a="http://schemas.openxmlformats.org/drawingml/2006/main" xmlns:r="http://schemas.openxmlformats.org/officeDocument/2006/relationships" xmlns:p="http://schemas.openxmlformats.org/presentationml/2006/main">
   <p:cSld>
+    <p:bg>
+      <p:bgPr>
+        <a:blipFill dpi="0" rotWithShape="1">
+          <a:blip r:embed="rId2">
+            <a:alphaModFix amt="34000"/>
+            <a:lum/>
+          </a:blip>
+          <a:srcRect/>
+          <a:stretch>
+            <a:fillRect/>
+          </a:stretch>
+        </a:blipFill>
+        <a:effectLst/>
+      </p:bgPr>
+    </p:bg>
     <p:spTree>
       <p:nvGrpSpPr>
         <p:cNvPr id="1" name=""/>
@@ -4135,42 +4400,67 @@
             <p:ph type="title"/>
           </p:nvPr>
         </p:nvSpPr>
-        <p:spPr/>
-        <p:txBody>
-          <a:bodyPr/>
-          <a:lstStyle/>
+        <p:spPr>
+          <a:xfrm>
+            <a:off x="838200" y="316999"/>
+            <a:ext cx="10515600" cy="1325563"/>
+          </a:xfrm>
+        </p:spPr>
+        <p:txBody>
+          <a:bodyPr/>
+          <a:lstStyle/>
+          <a:p>
+            <a:r>
+              <a:rPr lang="en-US" b="1" dirty="0"/>
+              <a:t>Future Work</a:t>
+            </a:r>
+          </a:p>
+        </p:txBody>
+      </p:sp>
+      <p:sp>
+        <p:nvSpPr>
+          <p:cNvPr id="3" name="Content Placeholder 2">
+            <a:extLst>
+              <a:ext uri="{FF2B5EF4-FFF2-40B4-BE49-F238E27FC236}">
+                <a16:creationId xmlns:a16="http://schemas.microsoft.com/office/drawing/2014/main" id="{3FFB97CD-8E21-4099-A048-8C0E12F485EA}"/>
+              </a:ext>
+            </a:extLst>
+          </p:cNvPr>
+          <p:cNvSpPr>
+            <a:spLocks noGrp="1"/>
+          </p:cNvSpPr>
+          <p:nvPr>
+            <p:ph idx="1"/>
+          </p:nvPr>
+        </p:nvSpPr>
+        <p:spPr/>
+        <p:txBody>
+          <a:bodyPr>
+            <a:normAutofit lnSpcReduction="10000"/>
+          </a:bodyPr>
+          <a:lstStyle/>
+          <a:p>
+            <a:r>
+              <a:rPr lang="en-US" strike="sngStrike" dirty="0"/>
+              <a:t>Northeast State Technologies Division Data Center Integration</a:t>
+            </a:r>
+          </a:p>
+          <a:p>
+            <a:endParaRPr lang="en-US" dirty="0"/>
+          </a:p>
           <a:p>
             <a:r>
               <a:rPr lang="en-US" dirty="0"/>
-              <a:t>Future Work</a:t>
-            </a:r>
-          </a:p>
-        </p:txBody>
-      </p:sp>
-      <p:sp>
-        <p:nvSpPr>
-          <p:cNvPr id="3" name="Content Placeholder 2">
-            <a:extLst>
-              <a:ext uri="{FF2B5EF4-FFF2-40B4-BE49-F238E27FC236}">
-                <a16:creationId xmlns:a16="http://schemas.microsoft.com/office/drawing/2014/main" id="{3FFB97CD-8E21-4099-A048-8C0E12F485EA}"/>
-              </a:ext>
-            </a:extLst>
-          </p:cNvPr>
-          <p:cNvSpPr>
-            <a:spLocks noGrp="1"/>
-          </p:cNvSpPr>
-          <p:nvPr>
-            <p:ph idx="1"/>
-          </p:nvPr>
-        </p:nvSpPr>
-        <p:spPr/>
-        <p:txBody>
-          <a:bodyPr/>
-          <a:lstStyle/>
+              <a:t>Adapt existing work to all games in personal Sega ROM Library</a:t>
+            </a:r>
+          </a:p>
+          <a:p>
+            <a:endParaRPr lang="en-US" dirty="0"/>
+          </a:p>
           <a:p>
             <a:r>
               <a:rPr lang="en-US" dirty="0"/>
-              <a:t>Adapt existing work to all games in Sega ROM Library</a:t>
+              <a:t>Develop new integrations for Open AI Gym Retro</a:t>
             </a:r>
           </a:p>
           <a:p>
@@ -4179,7 +4469,7 @@
           <a:p>
             <a:r>
               <a:rPr lang="en-US" dirty="0"/>
-              <a:t>New integrations for Open AI Gym Retro</a:t>
+              <a:t>Host in house AI competitions</a:t>
             </a:r>
           </a:p>
           <a:p>
@@ -4188,7 +4478,7 @@
           <a:p>
             <a:r>
               <a:rPr lang="en-US" dirty="0"/>
-              <a:t>In house AI competitions</a:t>
+              <a:t>Create simulation editor GUI</a:t>
             </a:r>
           </a:p>
         </p:txBody>
@@ -4209,6 +4499,21 @@
 <file path=ppt/slides/slide9.xml><?xml version="1.0" encoding="utf-8"?>
 <p:sld xmlns:a="http://schemas.openxmlformats.org/drawingml/2006/main" xmlns:r="http://schemas.openxmlformats.org/officeDocument/2006/relationships" xmlns:p="http://schemas.openxmlformats.org/presentationml/2006/main">
   <p:cSld>
+    <p:bg>
+      <p:bgPr>
+        <a:blipFill dpi="0" rotWithShape="1">
+          <a:blip r:embed="rId2">
+            <a:alphaModFix amt="34000"/>
+            <a:lum/>
+          </a:blip>
+          <a:srcRect/>
+          <a:stretch>
+            <a:fillRect/>
+          </a:stretch>
+        </a:blipFill>
+        <a:effectLst/>
+      </p:bgPr>
+    </p:bg>
     <p:spTree>
       <p:nvGrpSpPr>
         <p:cNvPr id="1" name=""/>
@@ -4245,7 +4550,7 @@
           <a:lstStyle/>
           <a:p>
             <a:r>
-              <a:rPr lang="en-US" dirty="0"/>
+              <a:rPr lang="en-US" b="1" dirty="0"/>
               <a:t>Questions</a:t>
             </a:r>
           </a:p>
@@ -4274,7 +4579,7 @@
           <a:p>
             <a:r>
               <a:rPr lang="en-US" dirty="0">
-                <a:hlinkClick r:id="rId2"/>
+                <a:hlinkClick r:id="rId3"/>
               </a:rPr>
               <a:t>jnmcmeen@northeaststate.edu</a:t>
             </a:r>
@@ -4285,15 +4590,23 @@
           </a:p>
           <a:p>
             <a:r>
-              <a:rPr lang="en-US" dirty="0" err="1"/>
-              <a:t>Github</a:t>
-            </a:r>
-            <a:r>
               <a:rPr lang="en-US" dirty="0"/>
-              <a:t>:</a:t>
-            </a:r>
-          </a:p>
-          <a:p>
+              <a:t>Find Me in Lab 243! Northeast State Technologies Building</a:t>
+            </a:r>
+          </a:p>
+          <a:p>
+            <a:endParaRPr lang="en-US" dirty="0"/>
+          </a:p>
+          <a:p>
+            <a:r>
+              <a:rPr lang="en-US" dirty="0"/>
+              <a:t>Cave T219</a:t>
+            </a:r>
+          </a:p>
+          <a:p>
+            <a:pPr marL="0" indent="0">
+              <a:buNone/>
+            </a:pPr>
             <a:endParaRPr lang="en-US" dirty="0"/>
           </a:p>
           <a:p>

</xml_diff>

<commit_message>
Moved some stuff around, new generalized sim interface that needs a lot of work.
</commit_message>
<xml_diff>
--- a/presentation/Evolving Neural Networks for Retro Video Games.pptx
+++ b/presentation/Evolving Neural Networks for Retro Video Games.pptx
@@ -268,7 +268,7 @@
           <a:p>
             <a:fld id="{62CE6098-7321-4951-8131-E38A2F96185C}" type="datetimeFigureOut">
               <a:rPr lang="en-US" smtClean="0"/>
-              <a:t>2/4/2021</a:t>
+              <a:t>1/24/2022</a:t>
             </a:fld>
             <a:endParaRPr lang="en-US"/>
           </a:p>
@@ -466,7 +466,7 @@
           <a:p>
             <a:fld id="{62CE6098-7321-4951-8131-E38A2F96185C}" type="datetimeFigureOut">
               <a:rPr lang="en-US" smtClean="0"/>
-              <a:t>2/4/2021</a:t>
+              <a:t>1/24/2022</a:t>
             </a:fld>
             <a:endParaRPr lang="en-US"/>
           </a:p>
@@ -674,7 +674,7 @@
           <a:p>
             <a:fld id="{62CE6098-7321-4951-8131-E38A2F96185C}" type="datetimeFigureOut">
               <a:rPr lang="en-US" smtClean="0"/>
-              <a:t>2/4/2021</a:t>
+              <a:t>1/24/2022</a:t>
             </a:fld>
             <a:endParaRPr lang="en-US"/>
           </a:p>
@@ -872,7 +872,7 @@
           <a:p>
             <a:fld id="{62CE6098-7321-4951-8131-E38A2F96185C}" type="datetimeFigureOut">
               <a:rPr lang="en-US" smtClean="0"/>
-              <a:t>2/4/2021</a:t>
+              <a:t>1/24/2022</a:t>
             </a:fld>
             <a:endParaRPr lang="en-US"/>
           </a:p>
@@ -1147,7 +1147,7 @@
           <a:p>
             <a:fld id="{62CE6098-7321-4951-8131-E38A2F96185C}" type="datetimeFigureOut">
               <a:rPr lang="en-US" smtClean="0"/>
-              <a:t>2/4/2021</a:t>
+              <a:t>1/24/2022</a:t>
             </a:fld>
             <a:endParaRPr lang="en-US"/>
           </a:p>
@@ -1412,7 +1412,7 @@
           <a:p>
             <a:fld id="{62CE6098-7321-4951-8131-E38A2F96185C}" type="datetimeFigureOut">
               <a:rPr lang="en-US" smtClean="0"/>
-              <a:t>2/4/2021</a:t>
+              <a:t>1/24/2022</a:t>
             </a:fld>
             <a:endParaRPr lang="en-US"/>
           </a:p>
@@ -1824,7 +1824,7 @@
           <a:p>
             <a:fld id="{62CE6098-7321-4951-8131-E38A2F96185C}" type="datetimeFigureOut">
               <a:rPr lang="en-US" smtClean="0"/>
-              <a:t>2/4/2021</a:t>
+              <a:t>1/24/2022</a:t>
             </a:fld>
             <a:endParaRPr lang="en-US"/>
           </a:p>
@@ -1965,7 +1965,7 @@
           <a:p>
             <a:fld id="{62CE6098-7321-4951-8131-E38A2F96185C}" type="datetimeFigureOut">
               <a:rPr lang="en-US" smtClean="0"/>
-              <a:t>2/4/2021</a:t>
+              <a:t>1/24/2022</a:t>
             </a:fld>
             <a:endParaRPr lang="en-US"/>
           </a:p>
@@ -2078,7 +2078,7 @@
           <a:p>
             <a:fld id="{62CE6098-7321-4951-8131-E38A2F96185C}" type="datetimeFigureOut">
               <a:rPr lang="en-US" smtClean="0"/>
-              <a:t>2/4/2021</a:t>
+              <a:t>1/24/2022</a:t>
             </a:fld>
             <a:endParaRPr lang="en-US"/>
           </a:p>
@@ -2389,7 +2389,7 @@
           <a:p>
             <a:fld id="{62CE6098-7321-4951-8131-E38A2F96185C}" type="datetimeFigureOut">
               <a:rPr lang="en-US" smtClean="0"/>
-              <a:t>2/4/2021</a:t>
+              <a:t>1/24/2022</a:t>
             </a:fld>
             <a:endParaRPr lang="en-US"/>
           </a:p>
@@ -2677,7 +2677,7 @@
           <a:p>
             <a:fld id="{62CE6098-7321-4951-8131-E38A2F96185C}" type="datetimeFigureOut">
               <a:rPr lang="en-US" smtClean="0"/>
-              <a:t>2/4/2021</a:t>
+              <a:t>1/24/2022</a:t>
             </a:fld>
             <a:endParaRPr lang="en-US"/>
           </a:p>
@@ -2918,7 +2918,7 @@
           <a:p>
             <a:fld id="{62CE6098-7321-4951-8131-E38A2F96185C}" type="datetimeFigureOut">
               <a:rPr lang="en-US" smtClean="0"/>
-              <a:t>2/4/2021</a:t>
+              <a:t>1/24/2022</a:t>
             </a:fld>
             <a:endParaRPr lang="en-US"/>
           </a:p>
@@ -3364,7 +3364,7 @@
         <p:spPr>
           <a:xfrm>
             <a:off x="5388075" y="3429000"/>
-            <a:ext cx="6587613" cy="1815882"/>
+            <a:ext cx="6587613" cy="1384995"/>
           </a:xfrm>
           <a:prstGeom prst="rect">
             <a:avLst/>
@@ -3392,12 +3392,6 @@
             <a:r>
               <a:rPr lang="en-US" sz="2800" dirty="0"/>
               <a:t>Northeast State Community College</a:t>
-            </a:r>
-          </a:p>
-          <a:p>
-            <a:r>
-              <a:rPr lang="en-US" sz="2800" dirty="0"/>
-              <a:t>2/4/2021</a:t>
             </a:r>
           </a:p>
         </p:txBody>
@@ -4180,7 +4174,7 @@
           <a:p>
             <a:r>
               <a:rPr lang="en-US" dirty="0"/>
-              <a:t>Ken Stanley in 2002 while at The University of Texas at Austin</a:t>
+              <a:t>Dr. Ken Stanley in 2002 while at The University of Texas at Austin</a:t>
             </a:r>
           </a:p>
           <a:p>
@@ -4294,6 +4288,28 @@
             </a:r>
           </a:p>
           <a:p>
+            <a:pPr lvl="1"/>
+            <a:r>
+              <a:rPr lang="en-US" dirty="0">
+                <a:hlinkClick r:id="rId3"/>
+              </a:rPr>
+              <a:t>https://www.youtube.com/playlist?list=PLTWFMbPFsvz3CeozHfeuJIXWAJMkPtAdS</a:t>
+            </a:r>
+          </a:p>
+          <a:p>
+            <a:pPr lvl="1"/>
+            <a:r>
+              <a:rPr lang="en-US" dirty="0">
+                <a:hlinkClick r:id="rId3"/>
+              </a:rPr>
+              <a:t>https://gitlab.com/lucasrthompson/Sonic-Bot-In-OpenAI-and-NEAT</a:t>
+            </a:r>
+            <a:endParaRPr lang="en-US" dirty="0"/>
+          </a:p>
+          <a:p>
+            <a:pPr marL="0" indent="0">
+              <a:buNone/>
+            </a:pPr>
             <a:endParaRPr lang="en-US" dirty="0"/>
           </a:p>
           <a:p>
@@ -4316,7 +4332,7 @@
             </a:r>
             <a:r>
               <a:rPr lang="en-US" dirty="0">
-                <a:hlinkClick r:id="rId3"/>
+                <a:hlinkClick r:id="rId4"/>
               </a:rPr>
               <a:t>https://github.com/jmcmeen/novus-retro.git</a:t>
             </a:r>
@@ -4591,7 +4607,7 @@
           <a:p>
             <a:r>
               <a:rPr lang="en-US" dirty="0"/>
-              <a:t>Find Me in Lab 243! Northeast State Technologies Building</a:t>
+              <a:t>Find Me in Lab T243! Northeast State Technologies Building</a:t>
             </a:r>
           </a:p>
           <a:p>
@@ -4600,7 +4616,7 @@
           <a:p>
             <a:r>
               <a:rPr lang="en-US" dirty="0"/>
-              <a:t>Cave T219</a:t>
+              <a:t>Cave/Office: T219</a:t>
             </a:r>
           </a:p>
           <a:p>

</xml_diff>